<commit_message>
Initial Sentinel app state
</commit_message>
<xml_diff>
--- a/presentations/INIT-001/decks/utc-internal/export.pptx
+++ b/presentations/INIT-001/decks/utc-internal/export.pptx
@@ -1290,7 +1290,7 @@
                   <a:srgbClr val="000000"/>
                 </a:solidFill>
               </a:rPr>
-              <a:t>Pressure to initiative alignment for execution discipline.</a:t>
+              <a:t>test prompt</a:t>
             </a:r>
             <a:endParaRPr lang="en-US" sz="1600" dirty="0"/>
           </a:p>
@@ -1439,6 +1439,21 @@
                   <a:srgbClr val="000000"/>
                 </a:solidFill>
               </a:rPr>
+              <a:t>Operator intent: test prompt</a:t>
+            </a:r>
+            <a:endParaRPr lang="en-US" sz="1800" dirty="0"/>
+          </a:p>
+          <a:p>
+            <a:pPr marL="228600" indent="-228600">
+              <a:buSzPct val="100000"/>
+              <a:buChar char="•"/>
+            </a:pPr>
+            <a:r>
+              <a:rPr lang="en-US" sz="1800" dirty="0">
+                <a:solidFill>
+                  <a:srgbClr val="000000"/>
+                </a:solidFill>
+              </a:rPr>
               <a:t>Capital bottleneck: funding does not meet project timing</a:t>
             </a:r>
             <a:endParaRPr lang="en-US" sz="1800" dirty="0"/>
@@ -1679,6 +1694,21 @@
                 </a:solidFill>
               </a:rPr>
               <a:t>Risk: phased gates compress downside</a:t>
+            </a:r>
+            <a:endParaRPr lang="en-US" sz="1800" dirty="0"/>
+          </a:p>
+          <a:p>
+            <a:pPr marL="228600" indent="-228600">
+              <a:buSzPct val="100000"/>
+              <a:buChar char="•"/>
+            </a:pPr>
+            <a:r>
+              <a:rPr lang="en-US" sz="1800" dirty="0">
+                <a:solidFill>
+                  <a:srgbClr val="000000"/>
+                </a:solidFill>
+              </a:rPr>
+              <a:t>Operator intent: test prompt</a:t>
             </a:r>
             <a:endParaRPr lang="en-US" sz="1800" dirty="0"/>
           </a:p>

</xml_diff>